<commit_message>
Added "detect disp size method"
</commit_message>
<xml_diff>
--- a/SNS-TWITTER/input/Twitter-PPT.pptx
+++ b/SNS-TWITTER/input/Twitter-PPT.pptx
@@ -253,7 +253,7 @@
             <a:fld id="{142E25DA-8965-D74A-8DD4-05D14E9E99D3}" type="datetimeFigureOut">
               <a:rPr lang="ja-JP" altLang="en-US" smtClean="0"/>
               <a:pPr/>
-              <a:t>2019/10/15</a:t>
+              <a:t>2019/10/23</a:t>
             </a:fld>
             <a:endParaRPr lang="ja-JP" altLang="en-US" dirty="0"/>
           </a:p>
@@ -1132,7 +1132,7 @@
           <a:p>
             <a:fld id="{C0498FD4-D935-9D4A-9397-7D0B951BB7B1}" type="datetimeFigureOut">
               <a:rPr kumimoji="1" lang="ja-JP" altLang="en-US" smtClean="0"/>
-              <a:t>2019/10/15</a:t>
+              <a:t>2019/10/23</a:t>
             </a:fld>
             <a:endParaRPr kumimoji="1" lang="ja-JP" altLang="en-US"/>
           </a:p>
@@ -1244,7 +1244,7 @@
           <a:p>
             <a:fld id="{C0498FD4-D935-9D4A-9397-7D0B951BB7B1}" type="datetimeFigureOut">
               <a:rPr kumimoji="1" lang="ja-JP" altLang="en-US" smtClean="0"/>
-              <a:t>2019/10/15</a:t>
+              <a:t>2019/10/23</a:t>
             </a:fld>
             <a:endParaRPr kumimoji="1" lang="ja-JP" altLang="en-US"/>
           </a:p>
@@ -1334,7 +1334,7 @@
           <a:p>
             <a:fld id="{C0498FD4-D935-9D4A-9397-7D0B951BB7B1}" type="datetimeFigureOut">
               <a:rPr kumimoji="1" lang="ja-JP" altLang="en-US" smtClean="0"/>
-              <a:t>2019/10/15</a:t>
+              <a:t>2019/10/23</a:t>
             </a:fld>
             <a:endParaRPr kumimoji="1" lang="ja-JP" altLang="en-US"/>
           </a:p>
@@ -1636,7 +1636,7 @@
           <a:p>
             <a:fld id="{C0498FD4-D935-9D4A-9397-7D0B951BB7B1}" type="datetimeFigureOut">
               <a:rPr kumimoji="1" lang="ja-JP" altLang="en-US" smtClean="0"/>
-              <a:t>2019/10/15</a:t>
+              <a:t>2019/10/23</a:t>
             </a:fld>
             <a:endParaRPr kumimoji="1" lang="ja-JP" altLang="en-US"/>
           </a:p>
@@ -1883,7 +1883,7 @@
           <a:p>
             <a:fld id="{C0498FD4-D935-9D4A-9397-7D0B951BB7B1}" type="datetimeFigureOut">
               <a:rPr kumimoji="1" lang="ja-JP" altLang="en-US" smtClean="0"/>
-              <a:t>2019/10/15</a:t>
+              <a:t>2019/10/23</a:t>
             </a:fld>
             <a:endParaRPr kumimoji="1" lang="ja-JP" altLang="en-US"/>
           </a:p>
@@ -2078,7 +2078,7 @@
           <a:p>
             <a:fld id="{C0498FD4-D935-9D4A-9397-7D0B951BB7B1}" type="datetimeFigureOut">
               <a:rPr kumimoji="1" lang="ja-JP" altLang="en-US" smtClean="0"/>
-              <a:t>2019/10/15</a:t>
+              <a:t>2019/10/23</a:t>
             </a:fld>
             <a:endParaRPr kumimoji="1" lang="ja-JP" altLang="en-US"/>
           </a:p>
@@ -2283,7 +2283,7 @@
           <a:p>
             <a:fld id="{C0498FD4-D935-9D4A-9397-7D0B951BB7B1}" type="datetimeFigureOut">
               <a:rPr kumimoji="1" lang="ja-JP" altLang="en-US" smtClean="0"/>
-              <a:t>2019/10/15</a:t>
+              <a:t>2019/10/23</a:t>
             </a:fld>
             <a:endParaRPr kumimoji="1" lang="ja-JP" altLang="en-US"/>
           </a:p>
@@ -3965,7 +3965,7 @@
           <a:p>
             <a:fld id="{C0498FD4-D935-9D4A-9397-7D0B951BB7B1}" type="datetimeFigureOut">
               <a:rPr kumimoji="1" lang="ja-JP" altLang="en-US" smtClean="0"/>
-              <a:t>2019/10/15</a:t>
+              <a:t>2019/10/23</a:t>
             </a:fld>
             <a:endParaRPr kumimoji="1" lang="ja-JP" altLang="en-US"/>
           </a:p>
@@ -4206,7 +4206,7 @@
             <a:fld id="{C0498FD4-D935-9D4A-9397-7D0B951BB7B1}" type="datetimeFigureOut">
               <a:rPr lang="ja-JP" altLang="en-US" smtClean="0"/>
               <a:pPr/>
-              <a:t>2019/10/15</a:t>
+              <a:t>2019/10/23</a:t>
             </a:fld>
             <a:endParaRPr lang="ja-JP" altLang="en-US" dirty="0"/>
           </a:p>
@@ -5177,21 +5177,6 @@
                 <a:cs typeface="メイリオ" panose="020B0604030504040204" pitchFamily="50" charset="-128"/>
               </a:rPr>
               <a:t>トップページ（スマートフォンでのファーストビュー）の比較。</a:t>
-            </a:r>
-            <a:endParaRPr lang="en-US" altLang="ja-JP" sz="1200" dirty="0">
-              <a:cs typeface="メイリオ" panose="020B0604030504040204" pitchFamily="50" charset="-128"/>
-            </a:endParaRPr>
-          </a:p>
-          <a:p>
-            <a:pPr>
-              <a:buFont typeface="Wingdings" panose="05000000000000000000" pitchFamily="2" charset="2"/>
-              <a:buChar char="Ø"/>
-            </a:pPr>
-            <a:r>
-              <a:rPr lang="ja-JP" altLang="en-US" sz="1200" dirty="0">
-                <a:cs typeface="メイリオ" panose="020B0604030504040204" pitchFamily="50" charset="-128"/>
-              </a:rPr>
-              <a:t>ウェスティンホテル仙台様はヘッダー画像がないこともあり、公式アカウントとして一目では認知しづらい印象。</a:t>
             </a:r>
             <a:endParaRPr lang="en-US" altLang="ja-JP" sz="1200" dirty="0">
               <a:cs typeface="メイリオ" panose="020B0604030504040204" pitchFamily="50" charset="-128"/>

</xml_diff>